<commit_message>
Finished poster, references missing
</commit_message>
<xml_diff>
--- a/Poster SI.pptx
+++ b/Poster SI.pptx
@@ -231,6 +231,14 @@
     </p:ext>
   </p:extLst>
 </p:presentation>
+</file>
+
+<file path=ppt/revisionInfo.xml><?xml version="1.0" encoding="utf-8"?>
+<p1510:revInfo xmlns:a="http://schemas.openxmlformats.org/drawingml/2006/main" xmlns:r="http://schemas.openxmlformats.org/officeDocument/2006/relationships" xmlns:p1510="http://schemas.microsoft.com/office/powerpoint/2015/10/main">
+  <p1510:revLst>
+    <p1510:client id="{56F32115-BCCA-44A5-A36F-2E183E24BD54}" v="1144" dt="2020-06-26T17:13:53.607"/>
+  </p1510:revLst>
+</p1510:revInfo>
 </file>
 
 <file path=ppt/notesMasters/notesMaster1.xml><?xml version="1.0" encoding="utf-8"?>
@@ -12539,53 +12547,6 @@
           </a:p>
         </p:txBody>
       </p:sp>
-      <p:sp>
-        <p:nvSpPr>
-          <p:cNvPr id="91" name="Shape 91"/>
-          <p:cNvSpPr/>
-          <p:nvPr/>
-        </p:nvSpPr>
-        <p:spPr>
-          <a:xfrm>
-            <a:off x="36358264" y="4480972"/>
-            <a:ext cx="12447332" cy="961650"/>
-          </a:xfrm>
-          <a:prstGeom prst="rect">
-            <a:avLst/>
-          </a:prstGeom>
-          <a:solidFill>
-            <a:srgbClr val="0070C0"/>
-          </a:solidFill>
-          <a:ln w="9525" cap="flat" cmpd="sng">
-            <a:solidFill>
-              <a:schemeClr val="dk1"/>
-            </a:solidFill>
-            <a:prstDash val="solid"/>
-            <a:miter/>
-            <a:headEnd type="none" w="med" len="med"/>
-            <a:tailEnd type="none" w="med" len="med"/>
-          </a:ln>
-        </p:spPr>
-        <p:txBody>
-          <a:bodyPr lIns="127480" tIns="63740" rIns="127480" bIns="63740" anchor="ctr" anchorCtr="0">
-            <a:noAutofit/>
-          </a:bodyPr>
-          <a:lstStyle/>
-          <a:p>
-            <a:pPr algn="ctr">
-              <a:buSzPct val="25000"/>
-            </a:pPr>
-            <a:r>
-              <a:rPr lang="es-CO" sz="4936" b="1" dirty="0">
-                <a:solidFill>
-                  <a:schemeClr val="lt1"/>
-                </a:solidFill>
-              </a:rPr>
-              <a:t>DIAGRAM PHASE</a:t>
-            </a:r>
-          </a:p>
-        </p:txBody>
-      </p:sp>
       <p:pic>
         <p:nvPicPr>
           <p:cNvPr id="6" name="Imagen 5"/>
@@ -12624,7 +12585,7 @@
         </p:nvSpPr>
         <p:spPr>
           <a:xfrm>
-            <a:off x="14483660" y="27185497"/>
+            <a:off x="31120581" y="27532439"/>
             <a:ext cx="184731" cy="285591"/>
           </a:xfrm>
           <a:prstGeom prst="rect">
@@ -12769,10 +12730,10 @@
       </p:pic>
       <p:grpSp>
         <p:nvGrpSpPr>
-          <p:cNvPr id="31" name="Group 30">
+          <p:cNvPr id="29" name="Group 28">
             <a:extLst>
               <a:ext uri="{FF2B5EF4-FFF2-40B4-BE49-F238E27FC236}">
-                <a16:creationId xmlns:a16="http://schemas.microsoft.com/office/drawing/2014/main" id="{B49BF4D6-458D-4B42-A87A-BAADA4139B24}"/>
+                <a16:creationId xmlns:a16="http://schemas.microsoft.com/office/drawing/2014/main" id="{4DDE0CEC-1D81-4950-B23D-026544894D08}"/>
               </a:ext>
             </a:extLst>
           </p:cNvPr>
@@ -12782,148 +12743,124 @@
         <p:grpSpPr>
           <a:xfrm>
             <a:off x="1549885" y="5211062"/>
-            <a:ext cx="15238933" cy="9981484"/>
-            <a:chOff x="1537160" y="5211062"/>
-            <a:chExt cx="12447332" cy="8403090"/>
+            <a:ext cx="15238933" cy="12241062"/>
+            <a:chOff x="12776907" y="4586009"/>
+            <a:chExt cx="12447332" cy="10305356"/>
           </a:xfrm>
         </p:grpSpPr>
-        <p:grpSp>
-          <p:nvGrpSpPr>
-            <p:cNvPr id="29" name="Group 28">
-              <a:extLst>
-                <a:ext uri="{FF2B5EF4-FFF2-40B4-BE49-F238E27FC236}">
-                  <a16:creationId xmlns:a16="http://schemas.microsoft.com/office/drawing/2014/main" id="{4DDE0CEC-1D81-4950-B23D-026544894D08}"/>
-                </a:ext>
-              </a:extLst>
-            </p:cNvPr>
-            <p:cNvGrpSpPr/>
+        <p:sp>
+          <p:nvSpPr>
+            <p:cNvPr id="90" name="Shape 90"/>
+            <p:cNvSpPr/>
             <p:nvPr/>
-          </p:nvGrpSpPr>
-          <p:grpSpPr>
-            <a:xfrm>
-              <a:off x="1537160" y="5211062"/>
-              <a:ext cx="12447332" cy="7711746"/>
-              <a:chOff x="12776907" y="4586009"/>
-              <a:chExt cx="12447332" cy="7711746"/>
-            </a:xfrm>
-          </p:grpSpPr>
-          <p:sp>
-            <p:nvSpPr>
-              <p:cNvPr id="90" name="Shape 90"/>
-              <p:cNvSpPr/>
-              <p:nvPr/>
-            </p:nvSpPr>
-            <p:spPr>
-              <a:xfrm>
-                <a:off x="12776907" y="4586009"/>
-                <a:ext cx="12447332" cy="961650"/>
-              </a:xfrm>
-              <a:prstGeom prst="rect">
-                <a:avLst/>
-              </a:prstGeom>
-              <a:solidFill>
-                <a:srgbClr val="0070C0"/>
-              </a:solidFill>
-              <a:ln w="9525" cap="flat" cmpd="sng">
-                <a:solidFill>
-                  <a:schemeClr val="dk1"/>
-                </a:solidFill>
-                <a:prstDash val="solid"/>
-                <a:miter/>
-                <a:headEnd type="none" w="med" len="med"/>
-                <a:tailEnd type="none" w="med" len="med"/>
-              </a:ln>
-            </p:spPr>
-            <p:txBody>
-              <a:bodyPr lIns="127480" tIns="63740" rIns="127480" bIns="63740" anchor="ctr" anchorCtr="0">
-                <a:noAutofit/>
-              </a:bodyPr>
-              <a:lstStyle/>
-              <a:p>
-                <a:pPr algn="ctr">
-                  <a:buSzPct val="25000"/>
-                </a:pPr>
-                <a:r>
-                  <a:rPr lang="es-CO" sz="6000" b="1" dirty="0">
-                    <a:solidFill>
-                      <a:schemeClr val="lt1"/>
-                    </a:solidFill>
-                  </a:rPr>
-                  <a:t>Descripción del problema</a:t>
-                </a:r>
-              </a:p>
-            </p:txBody>
-          </p:sp>
-          <p:sp>
-            <p:nvSpPr>
-              <p:cNvPr id="20" name="CuadroTexto 19"/>
-              <p:cNvSpPr txBox="1"/>
-              <p:nvPr/>
-            </p:nvSpPr>
-            <p:spPr>
-              <a:xfrm>
-                <a:off x="12814195" y="6377352"/>
-                <a:ext cx="12372754" cy="5920403"/>
-              </a:xfrm>
-              <a:prstGeom prst="rect">
-                <a:avLst/>
-              </a:prstGeom>
-              <a:noFill/>
-            </p:spPr>
-            <p:txBody>
-              <a:bodyPr wrap="square" rtlCol="0">
-                <a:spAutoFit/>
-              </a:bodyPr>
-              <a:lstStyle/>
-              <a:p>
-                <a:pPr algn="just"/>
-                <a:r>
-                  <a:rPr lang="es-CO" sz="3500" dirty="0"/>
-                  <a:t>El problema de la traducción automática consiste en usar texto u audio en un idioma dado como entrada para un programa de computadora y que este retorne un texto u audio en otro idioma previamente definido. Uno de los primeros resultados en este campo fue el experimento de Georgetown (1954), en el cual fue posible la traducción de mas de sesenta oraciones del ruso al inglés. A día de hoy, tenemos a nuestra disposición varias aplicaciones que hacen uso de algoritmos de traducción automática, posiblemente el mas conocido sea el traductor de Google</a:t>
-                </a:r>
-                <a:r>
-                  <a:rPr lang="es-CO" sz="2872" dirty="0"/>
-                  <a:t>.</a:t>
-                </a:r>
-              </a:p>
-              <a:p>
-                <a:pPr algn="just"/>
-                <a:endParaRPr lang="es-CO" sz="2872" dirty="0"/>
-              </a:p>
-            </p:txBody>
-          </p:sp>
-        </p:grpSp>
-        <p:pic>
-          <p:nvPicPr>
-            <p:cNvPr id="4" name="Picture 3" descr="A close up of a logo&#10;&#10;Description automatically generated">
-              <a:extLst>
-                <a:ext uri="{FF2B5EF4-FFF2-40B4-BE49-F238E27FC236}">
-                  <a16:creationId xmlns:a16="http://schemas.microsoft.com/office/drawing/2014/main" id="{AC4B2974-ABE1-4BD0-827C-E70A68550D84}"/>
-                </a:ext>
-              </a:extLst>
-            </p:cNvPr>
-            <p:cNvPicPr>
-              <a:picLocks noChangeAspect="1"/>
-            </p:cNvPicPr>
-            <p:nvPr/>
-          </p:nvPicPr>
-          <p:blipFill>
-            <a:blip r:embed="rId5"/>
-            <a:stretch>
-              <a:fillRect/>
-            </a:stretch>
-          </p:blipFill>
+          </p:nvSpPr>
           <p:spPr>
             <a:xfrm>
-              <a:off x="5945748" y="11232783"/>
-              <a:ext cx="3442097" cy="2381369"/>
+              <a:off x="12776907" y="4586009"/>
+              <a:ext cx="12447332" cy="1467429"/>
             </a:xfrm>
             <a:prstGeom prst="rect">
               <a:avLst/>
             </a:prstGeom>
+            <a:solidFill>
+              <a:srgbClr val="0070C0"/>
+            </a:solidFill>
+            <a:ln w="9525" cap="flat" cmpd="sng">
+              <a:noFill/>
+              <a:prstDash val="solid"/>
+              <a:miter/>
+              <a:headEnd type="none" w="med" len="med"/>
+              <a:tailEnd type="none" w="med" len="med"/>
+            </a:ln>
           </p:spPr>
-        </p:pic>
+          <p:txBody>
+            <a:bodyPr lIns="127480" tIns="63740" rIns="127480" bIns="63740" anchor="ctr" anchorCtr="0">
+              <a:noAutofit/>
+            </a:bodyPr>
+            <a:lstStyle/>
+            <a:p>
+              <a:pPr algn="ctr">
+                <a:buSzPct val="25000"/>
+              </a:pPr>
+              <a:r>
+                <a:rPr lang="es-CO" sz="8000" b="1" dirty="0">
+                  <a:solidFill>
+                    <a:schemeClr val="lt1"/>
+                  </a:solidFill>
+                </a:rPr>
+                <a:t>Descripción del problema</a:t>
+              </a:r>
+            </a:p>
+          </p:txBody>
+        </p:sp>
+        <p:sp>
+          <p:nvSpPr>
+            <p:cNvPr id="20" name="CuadroTexto 19"/>
+            <p:cNvSpPr txBox="1"/>
+            <p:nvPr/>
+          </p:nvSpPr>
+          <p:spPr>
+            <a:xfrm>
+              <a:off x="12814195" y="6668328"/>
+              <a:ext cx="12372754" cy="8223037"/>
+            </a:xfrm>
+            <a:prstGeom prst="rect">
+              <a:avLst/>
+            </a:prstGeom>
+            <a:noFill/>
+            <a:ln>
+              <a:noFill/>
+            </a:ln>
+          </p:spPr>
+          <p:txBody>
+            <a:bodyPr wrap="square" rtlCol="0">
+              <a:spAutoFit/>
+            </a:bodyPr>
+            <a:lstStyle/>
+            <a:p>
+              <a:pPr algn="just"/>
+              <a:r>
+                <a:rPr lang="es-CO" sz="5000" dirty="0"/>
+                <a:t>El problema de la traducción automática consiste en usar texto u audio en un idioma dado como entrada para un programa de computadora y que este retorne un texto u audio en otro idioma previamente definido. Uno de los primeros resultados en este campo fue el experimento de Georgetown (1954), en el cual fue posible la traducción de mas de sesenta oraciones del ruso al inglés. A día de hoy, tenemos a nuestra disposición varias aplicaciones que hacen uso de algoritmos de traducción automática, posiblemente el mas conocido sea el traductor de Google.</a:t>
+              </a:r>
+            </a:p>
+            <a:p>
+              <a:pPr algn="just"/>
+              <a:endParaRPr lang="es-CO" sz="2872" dirty="0"/>
+            </a:p>
+          </p:txBody>
+        </p:sp>
       </p:grpSp>
+      <p:pic>
+        <p:nvPicPr>
+          <p:cNvPr id="4" name="Picture 3" descr="A close up of a logo&#10;&#10;Description automatically generated">
+            <a:extLst>
+              <a:ext uri="{FF2B5EF4-FFF2-40B4-BE49-F238E27FC236}">
+                <a16:creationId xmlns:a16="http://schemas.microsoft.com/office/drawing/2014/main" id="{AC4B2974-ABE1-4BD0-827C-E70A68550D84}"/>
+              </a:ext>
+            </a:extLst>
+          </p:cNvPr>
+          <p:cNvPicPr>
+            <a:picLocks noChangeAspect="1"/>
+          </p:cNvPicPr>
+          <p:nvPr/>
+        </p:nvPicPr>
+        <p:blipFill>
+          <a:blip r:embed="rId5"/>
+          <a:stretch>
+            <a:fillRect/>
+          </a:stretch>
+        </p:blipFill>
+        <p:spPr>
+          <a:xfrm>
+            <a:off x="6870632" y="17366304"/>
+            <a:ext cx="4214067" cy="2828673"/>
+          </a:xfrm>
+          <a:prstGeom prst="rect">
+            <a:avLst/>
+          </a:prstGeom>
+        </p:spPr>
+      </p:pic>
       <p:sp>
         <p:nvSpPr>
           <p:cNvPr id="92" name="Shape 92"/>
@@ -12932,8 +12869,8 @@
         </p:nvSpPr>
         <p:spPr>
           <a:xfrm>
-            <a:off x="1537162" y="16761472"/>
-            <a:ext cx="15206004" cy="1142281"/>
+            <a:off x="18211513" y="18929408"/>
+            <a:ext cx="15206004" cy="2051083"/>
           </a:xfrm>
           <a:prstGeom prst="rect">
             <a:avLst/>
@@ -12942,9 +12879,7 @@
             <a:srgbClr val="0070C0"/>
           </a:solidFill>
           <a:ln w="9525" cap="flat" cmpd="sng">
-            <a:solidFill>
-              <a:schemeClr val="dk1"/>
-            </a:solidFill>
+            <a:noFill/>
             <a:prstDash val="solid"/>
             <a:miter/>
             <a:headEnd type="none" w="med" len="med"/>
@@ -12961,7 +12896,7 @@
               <a:buSzPct val="25000"/>
             </a:pPr>
             <a:r>
-              <a:rPr lang="es-CO" sz="6000" b="1" dirty="0">
+              <a:rPr lang="es-CO" sz="8000" b="1" dirty="0">
                 <a:solidFill>
                   <a:schemeClr val="lt1"/>
                 </a:solidFill>
@@ -12979,8 +12914,8 @@
         </p:nvSpPr>
         <p:spPr>
           <a:xfrm>
-            <a:off x="1479024" y="18730169"/>
-            <a:ext cx="15308399" cy="3862596"/>
+            <a:off x="18153375" y="21806907"/>
+            <a:ext cx="15308399" cy="6247864"/>
           </a:xfrm>
           <a:prstGeom prst="rect">
             <a:avLst/>
@@ -12998,7 +12933,7 @@
               <a:buChar char="•"/>
             </a:pPr>
             <a:r>
-              <a:rPr lang="es-CO" sz="3500" dirty="0"/>
+              <a:rPr lang="es-CO" sz="5000" dirty="0"/>
               <a:t>Uno de los primeros métodos usados.</a:t>
             </a:r>
           </a:p>
@@ -13008,7 +12943,7 @@
               <a:buChar char="•"/>
             </a:pPr>
             <a:r>
-              <a:rPr lang="es-CO" sz="3500" dirty="0"/>
+              <a:rPr lang="es-CO" sz="5000" dirty="0"/>
               <a:t>Uso de reglas escritas a manos que definen como transformar oraciones de un lenguaje.</a:t>
             </a:r>
           </a:p>
@@ -13018,7 +12953,7 @@
               <a:buChar char="•"/>
             </a:pPr>
             <a:r>
-              <a:rPr lang="es-CO" sz="3500" dirty="0"/>
+              <a:rPr lang="es-CO" sz="5000" dirty="0"/>
               <a:t>Uso de diccionarios.</a:t>
             </a:r>
           </a:p>
@@ -13028,7 +12963,7 @@
               <a:buChar char="•"/>
             </a:pPr>
             <a:r>
-              <a:rPr lang="es-CO" sz="3500" dirty="0"/>
+              <a:rPr lang="es-CO" sz="5000" dirty="0"/>
               <a:t>No se requería ningún texto en el lenguaje destino, solo con el diccionario era suficiente.</a:t>
             </a:r>
           </a:p>
@@ -13038,7 +12973,7 @@
               <a:buChar char="•"/>
             </a:pPr>
             <a:r>
-              <a:rPr lang="es-CO" sz="3500" dirty="0"/>
+              <a:rPr lang="es-CO" sz="5000" dirty="0"/>
               <a:t>Se tienen registros de sistemas con hasta 70000 reglas.</a:t>
             </a:r>
           </a:p>
@@ -13058,7 +12993,7 @@
         </p:nvGrpSpPr>
         <p:grpSpPr>
           <a:xfrm>
-            <a:off x="2407226" y="23563286"/>
+            <a:off x="19447155" y="5601425"/>
             <a:ext cx="13524248" cy="11505068"/>
             <a:chOff x="1670291" y="17832622"/>
             <a:chExt cx="12552120" cy="10487835"/>
@@ -13309,8 +13244,8 @@
         </p:nvSpPr>
         <p:spPr>
           <a:xfrm>
-            <a:off x="18420659" y="5217702"/>
-            <a:ext cx="15238933" cy="1142281"/>
+            <a:off x="1630268" y="21599687"/>
+            <a:ext cx="15238933" cy="2577877"/>
           </a:xfrm>
           <a:prstGeom prst="rect">
             <a:avLst/>
@@ -13319,9 +13254,7 @@
             <a:srgbClr val="0070C0"/>
           </a:solidFill>
           <a:ln w="9525" cap="flat" cmpd="sng">
-            <a:solidFill>
-              <a:schemeClr val="dk1"/>
-            </a:solidFill>
+            <a:noFill/>
             <a:prstDash val="solid"/>
             <a:miter/>
             <a:headEnd type="none" w="med" len="med"/>
@@ -13338,7 +13271,7 @@
               <a:buSzPct val="25000"/>
             </a:pPr>
             <a:r>
-              <a:rPr lang="es-CO" sz="6000" b="1" dirty="0">
+              <a:rPr lang="es-CO" sz="8000" b="1" dirty="0">
                 <a:solidFill>
                   <a:schemeClr val="lt1"/>
                 </a:solidFill>
@@ -13362,8 +13295,8 @@
         </p:nvSpPr>
         <p:spPr>
           <a:xfrm>
-            <a:off x="18385928" y="7338882"/>
-            <a:ext cx="15308399" cy="3323987"/>
+            <a:off x="1595536" y="25043356"/>
+            <a:ext cx="15308399" cy="8556188"/>
           </a:xfrm>
           <a:prstGeom prst="rect">
             <a:avLst/>
@@ -13381,7 +13314,7 @@
               <a:buChar char="•"/>
             </a:pPr>
             <a:r>
-              <a:rPr lang="es-CO" sz="3500" dirty="0"/>
+              <a:rPr lang="es-CO" sz="5000" dirty="0"/>
               <a:t>Traducción por analogía siguiendo un razonamiento basado en casos.</a:t>
             </a:r>
           </a:p>
@@ -13391,7 +13324,17 @@
               <a:buChar char="•"/>
             </a:pPr>
             <a:r>
-              <a:rPr lang="es-CO" sz="3500" dirty="0"/>
+              <a:rPr lang="es-CO" sz="5000" dirty="0"/>
+              <a:t>También necesita un diccionario.</a:t>
+            </a:r>
+          </a:p>
+          <a:p>
+            <a:pPr marL="457200" indent="-457200" algn="just">
+              <a:buFont typeface="Arial" panose="020B0604020202020204" pitchFamily="34" charset="0"/>
+              <a:buChar char="•"/>
+            </a:pPr>
+            <a:r>
+              <a:rPr lang="es-CO" sz="5000" dirty="0"/>
               <a:t>Basado en la idea de que el ser humano traduce partiendo una oración en varias frases, las cuales son traducidas por analogía, y luego a partir de estas traducciones se construye la nueva oración.</a:t>
             </a:r>
           </a:p>
@@ -13401,7 +13344,7 @@
               <a:buChar char="•"/>
             </a:pPr>
             <a:r>
-              <a:rPr lang="es-CO" sz="3500" dirty="0"/>
+              <a:rPr lang="es-CO" sz="5000" dirty="0"/>
               <a:t>Requiere de textos tanto en el lenguaje original como en el destino.</a:t>
             </a:r>
           </a:p>
@@ -13410,43 +13353,14 @@
               <a:buFont typeface="Arial" panose="020B0604020202020204" pitchFamily="34" charset="0"/>
               <a:buChar char="•"/>
             </a:pPr>
-            <a:endParaRPr lang="es-CO" sz="3500" dirty="0"/>
+            <a:endParaRPr lang="es-CO" sz="5000" dirty="0"/>
           </a:p>
-        </p:txBody>
-      </p:sp>
-      <p:sp>
-        <p:nvSpPr>
-          <p:cNvPr id="48" name="CuadroTexto 10">
-            <a:extLst>
-              <a:ext uri="{FF2B5EF4-FFF2-40B4-BE49-F238E27FC236}">
-                <a16:creationId xmlns:a16="http://schemas.microsoft.com/office/drawing/2014/main" id="{9C006691-0A78-4463-807C-E581C1121616}"/>
-              </a:ext>
-            </a:extLst>
-          </p:cNvPr>
-          <p:cNvSpPr txBox="1"/>
-          <p:nvPr/>
-        </p:nvSpPr>
-        <p:spPr>
-          <a:xfrm>
-            <a:off x="34986636" y="16507128"/>
-            <a:ext cx="15308399" cy="3862596"/>
-          </a:xfrm>
-          <a:prstGeom prst="rect">
-            <a:avLst/>
-          </a:prstGeom>
-          <a:noFill/>
-        </p:spPr>
-        <p:txBody>
-          <a:bodyPr wrap="square" rtlCol="0">
-            <a:spAutoFit/>
-          </a:bodyPr>
-          <a:lstStyle/>
           <a:p>
-            <a:pPr algn="just"/>
-            <a:r>
-              <a:rPr lang="es-CO" sz="3500" dirty="0"/>
-              <a:t>La traducción basada en reglas (RBMT, por sus siglas en ingles) fue uno de las primeras metodologías que se usaron. Consiste en la utilización de reglas preestablecidas y un diccionario para realizar la traducción de un lenguaje a otro. Las reglas eran escritas “a mano” en un trabajo conjunto entre desarrolladores y científicos del lenguaje. Es probablemente el método que mas parecido tiene con respecto a como el ser humano realiza traducciones de un lenguaje a otro.</a:t>
-            </a:r>
+            <a:pPr marL="457200" indent="-457200" algn="just">
+              <a:buFont typeface="Arial" panose="020B0604020202020204" pitchFamily="34" charset="0"/>
+              <a:buChar char="•"/>
+            </a:pPr>
+            <a:endParaRPr lang="es-CO" sz="5000" dirty="0"/>
           </a:p>
         </p:txBody>
       </p:sp>
@@ -13479,8 +13393,8 @@
         </p:blipFill>
         <p:spPr bwMode="auto">
           <a:xfrm>
-            <a:off x="21473160" y="11641768"/>
-            <a:ext cx="8260080" cy="2746477"/>
+            <a:off x="1908893" y="31979565"/>
+            <a:ext cx="14137544" cy="4700734"/>
           </a:xfrm>
           <a:prstGeom prst="rect">
             <a:avLst/>
@@ -13511,8 +13425,8 @@
         </p:nvSpPr>
         <p:spPr>
           <a:xfrm>
-            <a:off x="18455394" y="16722097"/>
-            <a:ext cx="15238933" cy="1142281"/>
+            <a:off x="34551401" y="5211062"/>
+            <a:ext cx="15238933" cy="2780493"/>
           </a:xfrm>
           <a:prstGeom prst="rect">
             <a:avLst/>
@@ -13521,9 +13435,7 @@
             <a:srgbClr val="0070C0"/>
           </a:solidFill>
           <a:ln w="9525" cap="flat" cmpd="sng">
-            <a:solidFill>
-              <a:schemeClr val="dk1"/>
-            </a:solidFill>
+            <a:noFill/>
             <a:prstDash val="solid"/>
             <a:miter/>
             <a:headEnd type="none" w="med" len="med"/>
@@ -13540,13 +13452,317 @@
               <a:buSzPct val="25000"/>
             </a:pPr>
             <a:r>
-              <a:rPr lang="es-CO" sz="6000" b="1" dirty="0">
+              <a:rPr lang="es-CO" sz="8000" b="1" dirty="0">
                 <a:solidFill>
                   <a:schemeClr val="lt1"/>
                 </a:solidFill>
               </a:rPr>
-              <a:t>Traducción basada en redes neuronales</a:t>
+              <a:t>Traducción automática neuronal</a:t>
             </a:r>
+          </a:p>
+        </p:txBody>
+      </p:sp>
+      <p:sp>
+        <p:nvSpPr>
+          <p:cNvPr id="27" name="CuadroTexto 10">
+            <a:extLst>
+              <a:ext uri="{FF2B5EF4-FFF2-40B4-BE49-F238E27FC236}">
+                <a16:creationId xmlns:a16="http://schemas.microsoft.com/office/drawing/2014/main" id="{0135CE70-901A-4A5B-826D-2D9059684A29}"/>
+              </a:ext>
+            </a:extLst>
+          </p:cNvPr>
+          <p:cNvSpPr txBox="1"/>
+          <p:nvPr/>
+        </p:nvSpPr>
+        <p:spPr>
+          <a:xfrm>
+            <a:off x="34513721" y="8560463"/>
+            <a:ext cx="15308399" cy="10095071"/>
+          </a:xfrm>
+          <a:prstGeom prst="rect">
+            <a:avLst/>
+          </a:prstGeom>
+          <a:noFill/>
+        </p:spPr>
+        <p:txBody>
+          <a:bodyPr wrap="square" rtlCol="0" anchor="t">
+            <a:spAutoFit/>
+          </a:bodyPr>
+          <a:lstStyle/>
+          <a:p>
+            <a:pPr marL="457200" indent="-457200" algn="just">
+              <a:buFont typeface="Arial" panose="020B0604020202020204" pitchFamily="34" charset="0"/>
+              <a:buChar char="•"/>
+            </a:pPr>
+            <a:r>
+              <a:rPr lang="es-CO" sz="5000"/>
+              <a:t>Uso de redes neuronales, tipicamente de tipo recurrente.</a:t>
+            </a:r>
+            <a:endParaRPr lang="es-CO" sz="5000" dirty="0"/>
+          </a:p>
+          <a:p>
+            <a:pPr marL="457200" indent="-457200" algn="just">
+              <a:buFont typeface="Arial" panose="020B0604020202020204" pitchFamily="34" charset="0"/>
+              <a:buChar char="•"/>
+            </a:pPr>
+            <a:r>
+              <a:rPr lang="es-CO" sz="5000"/>
+              <a:t>Una red neuronal recurrente, llamada encoder, para transformar el texto de entrada.</a:t>
+            </a:r>
+            <a:endParaRPr lang="es-CO" sz="5000" dirty="0"/>
+          </a:p>
+          <a:p>
+            <a:pPr marL="457200" indent="-457200" algn="just">
+              <a:buFont typeface="Arial" panose="020B0604020202020204" pitchFamily="34" charset="0"/>
+              <a:buChar char="•"/>
+            </a:pPr>
+            <a:r>
+              <a:rPr lang="es-CO" sz="5000"/>
+              <a:t>Una red neuronal recurrente, llamada decoder, para transformar la salide del encoder en el texto de salida.</a:t>
+            </a:r>
+            <a:endParaRPr lang="es-CO" sz="5000" dirty="0"/>
+          </a:p>
+          <a:p>
+            <a:pPr marL="457200" indent="-457200" algn="just">
+              <a:buFont typeface="Arial" panose="020B0604020202020204" pitchFamily="34" charset="0"/>
+              <a:buChar char="•"/>
+            </a:pPr>
+            <a:r>
+              <a:rPr lang="es-CO" sz="5000"/>
+              <a:t>Existen modificaciones a esta arquitectura, como por ejemplo Attention, que mejoran el desempeño.</a:t>
+            </a:r>
+            <a:endParaRPr lang="es-CO" sz="5000" dirty="0"/>
+          </a:p>
+          <a:p>
+            <a:pPr marL="457200" indent="-457200" algn="just">
+              <a:buFont typeface="Arial" panose="020B0604020202020204" pitchFamily="34" charset="0"/>
+              <a:buChar char="•"/>
+            </a:pPr>
+            <a:r>
+              <a:rPr lang="es-CO" sz="5000"/>
+              <a:t>Requiere de textos en ambos idiomas para el entrenamiento.</a:t>
+            </a:r>
+          </a:p>
+          <a:p>
+            <a:pPr marL="457200" indent="-457200" algn="just">
+              <a:buFont typeface="Arial" panose="020B0604020202020204" pitchFamily="34" charset="0"/>
+              <a:buChar char="•"/>
+            </a:pPr>
+            <a:r>
+              <a:rPr lang="es-CO" sz="5000"/>
+              <a:t>Usado actualmente en servicios como Google Translate</a:t>
+            </a:r>
+          </a:p>
+        </p:txBody>
+      </p:sp>
+      <p:pic>
+        <p:nvPicPr>
+          <p:cNvPr id="2" name="Picture 2" descr="A screenshot of a cell phone&#10;&#10;Description automatically generated">
+            <a:extLst>
+              <a:ext uri="{FF2B5EF4-FFF2-40B4-BE49-F238E27FC236}">
+                <a16:creationId xmlns:a16="http://schemas.microsoft.com/office/drawing/2014/main" id="{72B86408-33DE-4392-B5E2-1790D558BB8B}"/>
+              </a:ext>
+            </a:extLst>
+          </p:cNvPr>
+          <p:cNvPicPr>
+            <a:picLocks noChangeAspect="1"/>
+          </p:cNvPicPr>
+          <p:nvPr/>
+        </p:nvPicPr>
+        <p:blipFill>
+          <a:blip r:embed="rId11"/>
+          <a:stretch>
+            <a:fillRect/>
+          </a:stretch>
+        </p:blipFill>
+        <p:spPr>
+          <a:xfrm>
+            <a:off x="18688565" y="29074419"/>
+            <a:ext cx="13829270" cy="5760308"/>
+          </a:xfrm>
+          <a:prstGeom prst="rect">
+            <a:avLst/>
+          </a:prstGeom>
+        </p:spPr>
+      </p:pic>
+      <p:pic>
+        <p:nvPicPr>
+          <p:cNvPr id="3" name="Picture 6" descr="A close up of a logo&#10;&#10;Description automatically generated">
+            <a:extLst>
+              <a:ext uri="{FF2B5EF4-FFF2-40B4-BE49-F238E27FC236}">
+                <a16:creationId xmlns:a16="http://schemas.microsoft.com/office/drawing/2014/main" id="{2FCD8D69-EF31-4D82-8A12-744FF112D912}"/>
+              </a:ext>
+            </a:extLst>
+          </p:cNvPr>
+          <p:cNvPicPr>
+            <a:picLocks noChangeAspect="1"/>
+          </p:cNvPicPr>
+          <p:nvPr/>
+        </p:nvPicPr>
+        <p:blipFill>
+          <a:blip r:embed="rId12"/>
+          <a:stretch>
+            <a:fillRect/>
+          </a:stretch>
+        </p:blipFill>
+        <p:spPr>
+          <a:xfrm>
+            <a:off x="36683350" y="18752923"/>
+            <a:ext cx="9818987" cy="9301548"/>
+          </a:xfrm>
+          <a:prstGeom prst="rect">
+            <a:avLst/>
+          </a:prstGeom>
+        </p:spPr>
+      </p:pic>
+      <p:sp>
+        <p:nvSpPr>
+          <p:cNvPr id="7" name="Shape 90">
+            <a:extLst>
+              <a:ext uri="{FF2B5EF4-FFF2-40B4-BE49-F238E27FC236}">
+                <a16:creationId xmlns:a16="http://schemas.microsoft.com/office/drawing/2014/main" id="{180297EF-6D57-48C6-BD47-6E4F5C1FA18B}"/>
+              </a:ext>
+            </a:extLst>
+          </p:cNvPr>
+          <p:cNvSpPr/>
+          <p:nvPr/>
+        </p:nvSpPr>
+        <p:spPr>
+          <a:xfrm>
+            <a:off x="34521831" y="28693019"/>
+            <a:ext cx="15238933" cy="1743063"/>
+          </a:xfrm>
+          <a:prstGeom prst="rect">
+            <a:avLst/>
+          </a:prstGeom>
+          <a:solidFill>
+            <a:srgbClr val="0070C0"/>
+          </a:solidFill>
+          <a:ln w="9525" cap="flat" cmpd="sng">
+            <a:noFill/>
+            <a:prstDash val="solid"/>
+            <a:miter/>
+            <a:headEnd type="none" w="med" len="med"/>
+            <a:tailEnd type="none" w="med" len="med"/>
+          </a:ln>
+        </p:spPr>
+        <p:txBody>
+          <a:bodyPr lIns="127480" tIns="63740" rIns="127480" bIns="63740" anchor="ctr" anchorCtr="0">
+            <a:noAutofit/>
+          </a:bodyPr>
+          <a:lstStyle/>
+          <a:p>
+            <a:pPr algn="ctr">
+              <a:buSzPct val="25000"/>
+            </a:pPr>
+            <a:r>
+              <a:rPr lang="es-CO" sz="8000" b="1">
+                <a:solidFill>
+                  <a:schemeClr val="lt1"/>
+                </a:solidFill>
+              </a:rPr>
+              <a:t>Referencias</a:t>
+            </a:r>
+            <a:endParaRPr lang="es-CO" sz="8000" b="1" dirty="0">
+              <a:solidFill>
+                <a:schemeClr val="lt1"/>
+              </a:solidFill>
+            </a:endParaRPr>
+          </a:p>
+        </p:txBody>
+      </p:sp>
+      <p:sp>
+        <p:nvSpPr>
+          <p:cNvPr id="31" name="CuadroTexto 10">
+            <a:extLst>
+              <a:ext uri="{FF2B5EF4-FFF2-40B4-BE49-F238E27FC236}">
+                <a16:creationId xmlns:a16="http://schemas.microsoft.com/office/drawing/2014/main" id="{4AE40975-6538-491A-A3FE-BCFFFF9853AB}"/>
+              </a:ext>
+            </a:extLst>
+          </p:cNvPr>
+          <p:cNvSpPr txBox="1"/>
+          <p:nvPr/>
+        </p:nvSpPr>
+        <p:spPr>
+          <a:xfrm>
+            <a:off x="34563148" y="30802626"/>
+            <a:ext cx="14566994" cy="7786747"/>
+          </a:xfrm>
+          <a:prstGeom prst="rect">
+            <a:avLst/>
+          </a:prstGeom>
+          <a:noFill/>
+        </p:spPr>
+        <p:txBody>
+          <a:bodyPr wrap="square" rtlCol="0" anchor="t">
+            <a:spAutoFit/>
+          </a:bodyPr>
+          <a:lstStyle/>
+          <a:p>
+            <a:pPr marL="457200" indent="-457200" algn="just">
+              <a:buFont typeface="Arial" panose="020B0604020202020204" pitchFamily="34" charset="0"/>
+              <a:buChar char="•"/>
+            </a:pPr>
+            <a:r>
+              <a:rPr lang="es-CO" sz="5000" dirty="0">
+                <a:hlinkClick r:id="rId13"/>
+              </a:rPr>
+              <a:t>https://medium.com/free-code-camp/a-history-of-machine-translation-from-the-cold-war-to-deep-learning-f1d335ce8b5</a:t>
+            </a:r>
+            <a:endParaRPr lang="en-US"/>
+          </a:p>
+          <a:p>
+            <a:pPr marL="457200" indent="-457200" algn="just">
+              <a:buFont typeface="Arial" panose="020B0604020202020204" pitchFamily="34" charset="0"/>
+              <a:buChar char="•"/>
+            </a:pPr>
+            <a:r>
+              <a:rPr lang="es-CO" sz="5000" dirty="0">
+                <a:hlinkClick r:id="rId14"/>
+              </a:rPr>
+              <a:t>https://towardsdatascience.com/attention-based-neural-machine-translation-b5d129742e2c</a:t>
+            </a:r>
+          </a:p>
+          <a:p>
+            <a:pPr marL="457200" indent="-457200" algn="just">
+              <a:buFont typeface="Arial" panose="020B0604020202020204" pitchFamily="34" charset="0"/>
+              <a:buChar char="•"/>
+            </a:pPr>
+            <a:r>
+              <a:rPr lang="es-CO" sz="5000" dirty="0">
+                <a:hlinkClick r:id="rId15"/>
+              </a:rPr>
+              <a:t>https://arxiv.org/pdf/1912.02047.pdf</a:t>
+            </a:r>
+          </a:p>
+          <a:p>
+            <a:pPr marL="457200" indent="-457200" algn="just">
+              <a:buFont typeface="Arial" panose="020B0604020202020204" pitchFamily="34" charset="0"/>
+              <a:buChar char="•"/>
+            </a:pPr>
+            <a:r>
+              <a:rPr lang="es-CO" sz="5000" dirty="0">
+                <a:hlinkClick r:id="rId16"/>
+              </a:rPr>
+              <a:t>http://www.mt-archive.info/TMI-1990-Sumita.pdf</a:t>
+            </a:r>
+          </a:p>
+          <a:p>
+            <a:pPr marL="457200" indent="-457200" algn="just">
+              <a:buFont typeface="Arial" panose="020B0604020202020204" pitchFamily="34" charset="0"/>
+              <a:buChar char="•"/>
+            </a:pPr>
+            <a:r>
+              <a:rPr lang="es-CO" sz="5000" dirty="0"/>
+              <a:t>https://github.com/ChepeNBoys/Sist_Int/blob/master/papers/nagao1986.pdf</a:t>
+            </a:r>
+          </a:p>
+          <a:p>
+            <a:pPr marL="457200" indent="-457200" algn="just">
+              <a:buFont typeface="Arial" panose="020B0604020202020204" pitchFamily="34" charset="0"/>
+              <a:buChar char="•"/>
+            </a:pPr>
+            <a:endParaRPr lang="es-CO" sz="5000" dirty="0"/>
           </a:p>
         </p:txBody>
       </p:sp>

</xml_diff>

<commit_message>
Added References and PDFç
</commit_message>
<xml_diff>
--- a/Poster SI.pptx
+++ b/Poster SI.pptx
@@ -13686,7 +13686,7 @@
         <p:spPr>
           <a:xfrm>
             <a:off x="34563148" y="30802626"/>
-            <a:ext cx="14566994" cy="7786747"/>
+            <a:ext cx="15258972" cy="5355312"/>
           </a:xfrm>
           <a:prstGeom prst="rect">
             <a:avLst/>
@@ -13704,23 +13704,8 @@
               <a:buChar char="•"/>
             </a:pPr>
             <a:r>
-              <a:rPr lang="es-CO" sz="5000" dirty="0">
-                <a:hlinkClick r:id="rId13"/>
-              </a:rPr>
-              <a:t>https://medium.com/free-code-camp/a-history-of-machine-translation-from-the-cold-war-to-deep-learning-f1d335ce8b5</a:t>
-            </a:r>
-            <a:endParaRPr lang="en-US"/>
-          </a:p>
-          <a:p>
-            <a:pPr marL="457200" indent="-457200" algn="just">
-              <a:buFont typeface="Arial" panose="020B0604020202020204" pitchFamily="34" charset="0"/>
-              <a:buChar char="•"/>
-            </a:pPr>
-            <a:r>
-              <a:rPr lang="es-CO" sz="5000" dirty="0">
-                <a:hlinkClick r:id="rId14"/>
-              </a:rPr>
-              <a:t>https://towardsdatascience.com/attention-based-neural-machine-translation-b5d129742e2c</a:t>
+              <a:rPr lang="es-CO" sz="3800" dirty="0"/>
+              <a:t>Stahlberg, Felix. "Neural Machine Translation: A Review." arXiv preprint arXiv:1912.02047 (2019).</a:t>
             </a:r>
           </a:p>
           <a:p>
@@ -13729,10 +13714,8 @@
               <a:buChar char="•"/>
             </a:pPr>
             <a:r>
-              <a:rPr lang="es-CO" sz="5000" dirty="0">
-                <a:hlinkClick r:id="rId15"/>
-              </a:rPr>
-              <a:t>https://arxiv.org/pdf/1912.02047.pdf</a:t>
+              <a:rPr lang="es-CO" sz="3800" dirty="0"/>
+              <a:t>Sumita, Eiichiro, Hitoshi Iida, and Hideo Kohyama. "Translating with examples: a new approach to machine translation." The Third International Conference on Theoretical and Methodological Issues in Machine Translation of Natural Language. No. 3. 1990.</a:t>
             </a:r>
           </a:p>
           <a:p>
@@ -13741,28 +13724,205 @@
               <a:buChar char="•"/>
             </a:pPr>
             <a:r>
-              <a:rPr lang="es-CO" sz="5000" dirty="0">
-                <a:hlinkClick r:id="rId16"/>
-              </a:rPr>
-              <a:t>http://www.mt-archive.info/TMI-1990-Sumita.pdf</a:t>
+              <a:rPr lang="es-CO" sz="3800" dirty="0"/>
+              <a:t>M. Nagao, J. Tsujii and J. Nakamura, "Machine translation from japanese into english," in Proceedings of the IEEE, vol. 74, no. 7, pp. 993-1012, July 1986, doi: 10.1109/PROC.1986.13578.</a:t>
             </a:r>
           </a:p>
+        </p:txBody>
+      </p:sp>
+      <p:sp>
+        <p:nvSpPr>
+          <p:cNvPr id="8" name="TextBox 7">
+            <a:extLst>
+              <a:ext uri="{FF2B5EF4-FFF2-40B4-BE49-F238E27FC236}">
+                <a16:creationId xmlns:a16="http://schemas.microsoft.com/office/drawing/2014/main" id="{B7C27892-3C27-A74D-94A9-13BF986B9B2D}"/>
+              </a:ext>
+            </a:extLst>
+          </p:cNvPr>
+          <p:cNvSpPr txBox="1"/>
+          <p:nvPr/>
+        </p:nvSpPr>
+        <p:spPr>
+          <a:xfrm>
+            <a:off x="19891615" y="17106494"/>
+            <a:ext cx="13079788" cy="584775"/>
+          </a:xfrm>
+          <a:prstGeom prst="rect">
+            <a:avLst/>
+          </a:prstGeom>
+          <a:noFill/>
+        </p:spPr>
+        <p:txBody>
+          <a:bodyPr wrap="square" rtlCol="0">
+            <a:spAutoFit/>
+          </a:bodyPr>
+          <a:lstStyle/>
           <a:p>
-            <a:pPr marL="457200" indent="-457200" algn="just">
-              <a:buFont typeface="Arial" panose="020B0604020202020204" pitchFamily="34" charset="0"/>
-              <a:buChar char="•"/>
-            </a:pPr>
+            <a:pPr algn="ctr"/>
             <a:r>
-              <a:rPr lang="es-CO" sz="5000" dirty="0"/>
-              <a:t>https://github.com/ChepeNBoys/Sist_Int/blob/master/papers/nagao1986.pdf</a:t>
+              <a:rPr lang="en-GB" sz="3200" dirty="0" err="1"/>
+              <a:t>Tomado</a:t>
             </a:r>
+            <a:r>
+              <a:rPr lang="en-GB" sz="3200" dirty="0"/>
+              <a:t> de: https://</a:t>
+            </a:r>
+            <a:r>
+              <a:rPr lang="en-GB" sz="3200" dirty="0" err="1"/>
+              <a:t>bit.ly</a:t>
+            </a:r>
+            <a:r>
+              <a:rPr lang="en-GB" sz="3200" dirty="0"/>
+              <a:t>/2Vk3QY8</a:t>
+            </a:r>
+            <a:endParaRPr lang="en-US" sz="3200" dirty="0"/>
           </a:p>
+        </p:txBody>
+      </p:sp>
+      <p:sp>
+        <p:nvSpPr>
+          <p:cNvPr id="32" name="TextBox 31">
+            <a:extLst>
+              <a:ext uri="{FF2B5EF4-FFF2-40B4-BE49-F238E27FC236}">
+                <a16:creationId xmlns:a16="http://schemas.microsoft.com/office/drawing/2014/main" id="{FABB31E5-EE6B-2244-8E73-BB8DECDB4F50}"/>
+              </a:ext>
+            </a:extLst>
+          </p:cNvPr>
+          <p:cNvSpPr txBox="1"/>
+          <p:nvPr/>
+        </p:nvSpPr>
+        <p:spPr>
+          <a:xfrm>
+            <a:off x="19267680" y="34612821"/>
+            <a:ext cx="13079788" cy="584775"/>
+          </a:xfrm>
+          <a:prstGeom prst="rect">
+            <a:avLst/>
+          </a:prstGeom>
+          <a:noFill/>
+        </p:spPr>
+        <p:txBody>
+          <a:bodyPr wrap="square" rtlCol="0">
+            <a:spAutoFit/>
+          </a:bodyPr>
+          <a:lstStyle/>
           <a:p>
-            <a:pPr marL="457200" indent="-457200" algn="just">
-              <a:buFont typeface="Arial" panose="020B0604020202020204" pitchFamily="34" charset="0"/>
-              <a:buChar char="•"/>
-            </a:pPr>
-            <a:endParaRPr lang="es-CO" sz="5000" dirty="0"/>
+            <a:pPr algn="ctr"/>
+            <a:r>
+              <a:rPr lang="en-GB" sz="3200" dirty="0" err="1"/>
+              <a:t>Tomado</a:t>
+            </a:r>
+            <a:r>
+              <a:rPr lang="en-GB" sz="3200" dirty="0"/>
+              <a:t> de: https://</a:t>
+            </a:r>
+            <a:r>
+              <a:rPr lang="en-GB" sz="3200" dirty="0" err="1"/>
+              <a:t>bit.ly</a:t>
+            </a:r>
+            <a:r>
+              <a:rPr lang="en-GB" sz="3200" dirty="0"/>
+              <a:t>/2Vk3QY8</a:t>
+            </a:r>
+            <a:endParaRPr lang="en-US" sz="3200" dirty="0"/>
+          </a:p>
+        </p:txBody>
+      </p:sp>
+      <p:sp>
+        <p:nvSpPr>
+          <p:cNvPr id="33" name="TextBox 32">
+            <a:extLst>
+              <a:ext uri="{FF2B5EF4-FFF2-40B4-BE49-F238E27FC236}">
+                <a16:creationId xmlns:a16="http://schemas.microsoft.com/office/drawing/2014/main" id="{70DA3604-8428-C44D-AB8C-A32B52527805}"/>
+              </a:ext>
+            </a:extLst>
+          </p:cNvPr>
+          <p:cNvSpPr txBox="1"/>
+          <p:nvPr/>
+        </p:nvSpPr>
+        <p:spPr>
+          <a:xfrm>
+            <a:off x="35052949" y="27818030"/>
+            <a:ext cx="13079788" cy="584775"/>
+          </a:xfrm>
+          <a:prstGeom prst="rect">
+            <a:avLst/>
+          </a:prstGeom>
+          <a:noFill/>
+        </p:spPr>
+        <p:txBody>
+          <a:bodyPr wrap="square" rtlCol="0">
+            <a:spAutoFit/>
+          </a:bodyPr>
+          <a:lstStyle/>
+          <a:p>
+            <a:pPr algn="ctr"/>
+            <a:r>
+              <a:rPr lang="en-GB" sz="3200" dirty="0" err="1"/>
+              <a:t>Tomado</a:t>
+            </a:r>
+            <a:r>
+              <a:rPr lang="en-GB" sz="3200" dirty="0"/>
+              <a:t> de: https://</a:t>
+            </a:r>
+            <a:r>
+              <a:rPr lang="en-GB" sz="3200" dirty="0" err="1"/>
+              <a:t>bit.ly</a:t>
+            </a:r>
+            <a:r>
+              <a:rPr lang="en-GB" sz="3200" dirty="0"/>
+              <a:t>/381FGHg</a:t>
+            </a:r>
+            <a:endParaRPr lang="en-US" sz="3200" dirty="0"/>
+          </a:p>
+        </p:txBody>
+      </p:sp>
+      <p:sp>
+        <p:nvSpPr>
+          <p:cNvPr id="35" name="TextBox 34">
+            <a:extLst>
+              <a:ext uri="{FF2B5EF4-FFF2-40B4-BE49-F238E27FC236}">
+                <a16:creationId xmlns:a16="http://schemas.microsoft.com/office/drawing/2014/main" id="{FA3875EC-808C-DB48-BB48-2571483C98E1}"/>
+              </a:ext>
+            </a:extLst>
+          </p:cNvPr>
+          <p:cNvSpPr txBox="1"/>
+          <p:nvPr/>
+        </p:nvSpPr>
+        <p:spPr>
+          <a:xfrm>
+            <a:off x="2437771" y="35953398"/>
+            <a:ext cx="13079788" cy="584775"/>
+          </a:xfrm>
+          <a:prstGeom prst="rect">
+            <a:avLst/>
+          </a:prstGeom>
+          <a:noFill/>
+        </p:spPr>
+        <p:txBody>
+          <a:bodyPr wrap="square" rtlCol="0">
+            <a:spAutoFit/>
+          </a:bodyPr>
+          <a:lstStyle/>
+          <a:p>
+            <a:pPr algn="ctr"/>
+            <a:r>
+              <a:rPr lang="en-GB" sz="3200" dirty="0" err="1"/>
+              <a:t>Tomado</a:t>
+            </a:r>
+            <a:r>
+              <a:rPr lang="en-GB" sz="3200" dirty="0"/>
+              <a:t> de: https://</a:t>
+            </a:r>
+            <a:r>
+              <a:rPr lang="en-GB" sz="3200" dirty="0" err="1"/>
+              <a:t>bit.ly</a:t>
+            </a:r>
+            <a:r>
+              <a:rPr lang="en-GB" sz="3200" dirty="0"/>
+              <a:t>/2Vk3QY8</a:t>
+            </a:r>
+            <a:endParaRPr lang="en-US" sz="3200" dirty="0"/>
           </a:p>
         </p:txBody>
       </p:sp>

</xml_diff>